<commit_message>
Updated presentation and made github repository public
</commit_message>
<xml_diff>
--- a/Lowe’s_Campus_Hackathon_Presentation.pptx
+++ b/Lowe’s_Campus_Hackathon_Presentation.pptx
@@ -2199,7 +2199,7 @@
           <a:p>
             <a:fld id="{7977105C-EBAD-49A5-B276-B22DC497508D}" type="datetimeFigureOut">
               <a:rPr lang="en-IN" smtClean="0"/>
-              <a:t>28-02-2020</a:t>
+              <a:t>16-03-2020</a:t>
             </a:fld>
             <a:endParaRPr lang="en-IN"/>
           </a:p>
@@ -2460,7 +2460,7 @@
           <a:p>
             <a:fld id="{7977105C-EBAD-49A5-B276-B22DC497508D}" type="datetimeFigureOut">
               <a:rPr lang="en-IN" smtClean="0"/>
-              <a:t>28-02-2020</a:t>
+              <a:t>16-03-2020</a:t>
             </a:fld>
             <a:endParaRPr lang="en-IN"/>
           </a:p>
@@ -2784,7 +2784,7 @@
           <a:p>
             <a:fld id="{7977105C-EBAD-49A5-B276-B22DC497508D}" type="datetimeFigureOut">
               <a:rPr lang="en-IN" smtClean="0"/>
-              <a:t>28-02-2020</a:t>
+              <a:t>16-03-2020</a:t>
             </a:fld>
             <a:endParaRPr lang="en-IN"/>
           </a:p>
@@ -3127,7 +3127,7 @@
           <a:p>
             <a:fld id="{7977105C-EBAD-49A5-B276-B22DC497508D}" type="datetimeFigureOut">
               <a:rPr lang="en-IN" smtClean="0"/>
-              <a:t>28-02-2020</a:t>
+              <a:t>16-03-2020</a:t>
             </a:fld>
             <a:endParaRPr lang="en-IN"/>
           </a:p>
@@ -3451,7 +3451,7 @@
           <a:p>
             <a:fld id="{7977105C-EBAD-49A5-B276-B22DC497508D}" type="datetimeFigureOut">
               <a:rPr lang="en-IN" smtClean="0"/>
-              <a:t>28-02-2020</a:t>
+              <a:t>16-03-2020</a:t>
             </a:fld>
             <a:endParaRPr lang="en-IN"/>
           </a:p>
@@ -3854,7 +3854,7 @@
           <a:p>
             <a:fld id="{7977105C-EBAD-49A5-B276-B22DC497508D}" type="datetimeFigureOut">
               <a:rPr lang="en-IN" smtClean="0"/>
-              <a:t>28-02-2020</a:t>
+              <a:t>16-03-2020</a:t>
             </a:fld>
             <a:endParaRPr lang="en-IN"/>
           </a:p>
@@ -4034,7 +4034,7 @@
           <a:p>
             <a:fld id="{7977105C-EBAD-49A5-B276-B22DC497508D}" type="datetimeFigureOut">
               <a:rPr lang="en-IN" smtClean="0"/>
-              <a:t>28-02-2020</a:t>
+              <a:t>16-03-2020</a:t>
             </a:fld>
             <a:endParaRPr lang="en-IN"/>
           </a:p>
@@ -4224,7 +4224,7 @@
           <a:p>
             <a:fld id="{7977105C-EBAD-49A5-B276-B22DC497508D}" type="datetimeFigureOut">
               <a:rPr lang="en-IN" smtClean="0"/>
-              <a:t>28-02-2020</a:t>
+              <a:t>16-03-2020</a:t>
             </a:fld>
             <a:endParaRPr lang="en-IN"/>
           </a:p>
@@ -5009,7 +5009,7 @@
           <a:p>
             <a:fld id="{7977105C-EBAD-49A5-B276-B22DC497508D}" type="datetimeFigureOut">
               <a:rPr lang="en-IN" smtClean="0"/>
-              <a:t>28-02-2020</a:t>
+              <a:t>16-03-2020</a:t>
             </a:fld>
             <a:endParaRPr lang="en-IN"/>
           </a:p>
@@ -5266,7 +5266,7 @@
           <a:p>
             <a:fld id="{7977105C-EBAD-49A5-B276-B22DC497508D}" type="datetimeFigureOut">
               <a:rPr lang="en-IN" smtClean="0"/>
-              <a:t>28-02-2020</a:t>
+              <a:t>16-03-2020</a:t>
             </a:fld>
             <a:endParaRPr lang="en-IN"/>
           </a:p>
@@ -5508,7 +5508,7 @@
           <a:p>
             <a:fld id="{7977105C-EBAD-49A5-B276-B22DC497508D}" type="datetimeFigureOut">
               <a:rPr lang="en-IN" smtClean="0"/>
-              <a:t>28-02-2020</a:t>
+              <a:t>16-03-2020</a:t>
             </a:fld>
             <a:endParaRPr lang="en-IN"/>
           </a:p>
@@ -5892,7 +5892,7 @@
           <a:p>
             <a:fld id="{7977105C-EBAD-49A5-B276-B22DC497508D}" type="datetimeFigureOut">
               <a:rPr lang="en-IN" smtClean="0"/>
-              <a:t>28-02-2020</a:t>
+              <a:t>16-03-2020</a:t>
             </a:fld>
             <a:endParaRPr lang="en-IN"/>
           </a:p>
@@ -6025,7 +6025,7 @@
           <a:p>
             <a:fld id="{7977105C-EBAD-49A5-B276-B22DC497508D}" type="datetimeFigureOut">
               <a:rPr lang="en-IN" smtClean="0"/>
-              <a:t>28-02-2020</a:t>
+              <a:t>16-03-2020</a:t>
             </a:fld>
             <a:endParaRPr lang="en-IN"/>
           </a:p>
@@ -6130,7 +6130,7 @@
           <a:p>
             <a:fld id="{7977105C-EBAD-49A5-B276-B22DC497508D}" type="datetimeFigureOut">
               <a:rPr lang="en-IN" smtClean="0"/>
-              <a:t>28-02-2020</a:t>
+              <a:t>16-03-2020</a:t>
             </a:fld>
             <a:endParaRPr lang="en-IN"/>
           </a:p>
@@ -6394,7 +6394,7 @@
           <a:p>
             <a:fld id="{7977105C-EBAD-49A5-B276-B22DC497508D}" type="datetimeFigureOut">
               <a:rPr lang="en-IN" smtClean="0"/>
-              <a:t>28-02-2020</a:t>
+              <a:t>16-03-2020</a:t>
             </a:fld>
             <a:endParaRPr lang="en-IN"/>
           </a:p>
@@ -6718,7 +6718,7 @@
           <a:p>
             <a:fld id="{7977105C-EBAD-49A5-B276-B22DC497508D}" type="datetimeFigureOut">
               <a:rPr lang="en-IN" smtClean="0"/>
-              <a:t>28-02-2020</a:t>
+              <a:t>16-03-2020</a:t>
             </a:fld>
             <a:endParaRPr lang="en-IN"/>
           </a:p>
@@ -7421,7 +7421,7 @@
           <a:p>
             <a:fld id="{7977105C-EBAD-49A5-B276-B22DC497508D}" type="datetimeFigureOut">
               <a:rPr lang="en-IN" smtClean="0"/>
-              <a:t>28-02-2020</a:t>
+              <a:t>16-03-2020</a:t>
             </a:fld>
             <a:endParaRPr lang="en-IN"/>
           </a:p>
@@ -8131,7 +8131,7 @@
                   <a:schemeClr val="accent6"/>
                 </a:solidFill>
               </a:rPr>
-              <a:t> Add custom product filter to display products according to user’s requirements</a:t>
+              <a:t> Addition of images to product types and provide user with custom product filter option in order to display products according to user’s requirements</a:t>
             </a:r>
           </a:p>
           <a:p>
@@ -9745,40 +9745,6 @@
             </a:r>
           </a:p>
           <a:p>
-            <a:pPr marL="285750" lvl="0" indent="-285750" algn="l" rtl="0">
-              <a:spcBef>
-                <a:spcPts val="0"/>
-              </a:spcBef>
-              <a:spcAft>
-                <a:spcPts val="1600"/>
-              </a:spcAft>
-              <a:buFont typeface="Wingdings" panose="05000000000000000000" pitchFamily="2" charset="2"/>
-              <a:buChar char="Ø"/>
-            </a:pPr>
-            <a:r>
-              <a:rPr lang="en-US" sz="1600" dirty="0">
-                <a:solidFill>
-                  <a:schemeClr val="accent6"/>
-                </a:solidFill>
-              </a:rPr>
-              <a:t>A google drive link for the source code is listed below:    </a:t>
-            </a:r>
-            <a:r>
-              <a:rPr lang="en-US" sz="1600" dirty="0">
-                <a:solidFill>
-                  <a:schemeClr val="accent6"/>
-                </a:solidFill>
-                <a:hlinkClick r:id="rId3"/>
-              </a:rPr>
-              <a:t>http://bit.ly/2PwSiOt</a:t>
-            </a:r>
-            <a:endParaRPr lang="en-US" sz="1600" dirty="0">
-              <a:solidFill>
-                <a:schemeClr val="accent6"/>
-              </a:solidFill>
-            </a:endParaRPr>
-          </a:p>
-          <a:p>
             <a:pPr marL="285750" lvl="0" indent="-285750">
               <a:spcAft>
                 <a:spcPts val="1600"/>
@@ -9800,14 +9766,30 @@
                   <a:schemeClr val="accent1"/>
                 </a:solidFill>
               </a:rPr>
-              <a:t>private GitHub repository: </a:t>
+              <a:t>private GitHub repository (public after 16</a:t>
+            </a:r>
+            <a:r>
+              <a:rPr lang="en-US" sz="1600" b="1" baseline="30000" dirty="0">
+                <a:solidFill>
+                  <a:schemeClr val="accent1"/>
+                </a:solidFill>
+              </a:rPr>
+              <a:t>th</a:t>
+            </a:r>
+            <a:r>
+              <a:rPr lang="en-US" sz="1600" b="1" dirty="0">
+                <a:solidFill>
+                  <a:schemeClr val="accent1"/>
+                </a:solidFill>
+              </a:rPr>
+              <a:t> March 2020) : </a:t>
             </a:r>
             <a:r>
               <a:rPr lang="en-US" sz="1600" dirty="0">
                 <a:solidFill>
                   <a:schemeClr val="accent6"/>
                 </a:solidFill>
-                <a:hlinkClick r:id="rId4">
+                <a:hlinkClick r:id="rId3">
                   <a:extLst>
                     <a:ext uri="{A12FA001-AC4F-418D-AE19-62706E023703}">
                       <ahyp:hlinkClr xmlns:ahyp="http://schemas.microsoft.com/office/drawing/2018/hyperlinkcolor" val="tx"/>
@@ -9816,6 +9798,37 @@
                 </a:hlinkClick>
               </a:rPr>
               <a:t>https://github.com/rishindramani/Code-Paradox</a:t>
+            </a:r>
+            <a:endParaRPr lang="en-US" sz="1600" dirty="0">
+              <a:solidFill>
+                <a:schemeClr val="accent6"/>
+              </a:solidFill>
+            </a:endParaRPr>
+          </a:p>
+          <a:p>
+            <a:pPr marL="285750" indent="-285750">
+              <a:spcAft>
+                <a:spcPts val="1600"/>
+              </a:spcAft>
+              <a:buFont typeface="Wingdings" panose="05000000000000000000" pitchFamily="2" charset="2"/>
+              <a:buChar char="Ø"/>
+            </a:pPr>
+            <a:r>
+              <a:rPr lang="en-US" sz="1600">
+                <a:solidFill>
+                  <a:schemeClr val="accent6"/>
+                </a:solidFill>
+              </a:rPr>
+              <a:t>A google drive link for the source code is listed below:    </a:t>
+            </a:r>
+            <a:r>
+              <a:rPr lang="en-US" sz="1600">
+                <a:solidFill>
+                  <a:schemeClr val="accent6"/>
+                </a:solidFill>
+                <a:hlinkClick r:id="rId4"/>
+              </a:rPr>
+              <a:t>http://bit.ly/2PwSiOt</a:t>
             </a:r>
             <a:endParaRPr lang="en-US" sz="1600" dirty="0">
               <a:solidFill>

</xml_diff>